<commit_message>
adding new scores button
</commit_message>
<xml_diff>
--- a/Tiles - Presentation 3.pptx
+++ b/Tiles - Presentation 3.pptx
@@ -4253,13 +4253,8 @@
           <a:p>
             <a:r>
               <a:rPr lang="en-US" dirty="0" smtClean="0"/>
-              <a:t>Patterns which will get complicated as per </a:t>
-            </a:r>
-            <a:r>
-              <a:rPr lang="en-US" dirty="0" smtClean="0"/>
-              <a:t>level (dropped)</a:t>
-            </a:r>
-            <a:endParaRPr lang="en-US" dirty="0" smtClean="0"/>
+              <a:t>Patterns which will get complicated as per level (dropped)</a:t>
+            </a:r>
           </a:p>
           <a:p>
             <a:r>
@@ -4824,13 +4819,8 @@
           <a:p>
             <a:r>
               <a:rPr lang="en-US" dirty="0" smtClean="0"/>
-              <a:t>For now the project </a:t>
-            </a:r>
-            <a:r>
-              <a:rPr lang="en-US" dirty="0" smtClean="0"/>
-              <a:t>is a week delayed.</a:t>
-            </a:r>
-            <a:endParaRPr lang="en-US" dirty="0" smtClean="0"/>
+              <a:t>For now the project is a week delayed.</a:t>
+            </a:r>
           </a:p>
           <a:p>
             <a:r>
@@ -4851,10 +4841,6 @@
             <a:r>
               <a:rPr lang="en-US" dirty="0" smtClean="0"/>
               <a:t>.</a:t>
-            </a:r>
-            <a:r>
-              <a:rPr lang="en-US" dirty="0" smtClean="0"/>
-              <a:t/>
             </a:r>
             <a:br>
               <a:rPr lang="en-US" dirty="0" smtClean="0"/>
@@ -5674,7 +5660,17 @@
           <a:p>
             <a:r>
               <a:rPr lang="en-US" dirty="0" smtClean="0"/>
-              <a:t>Resume Game button should activate on press of back button.</a:t>
+              <a:t>Resume Game button should activate on press of back button</a:t>
+            </a:r>
+            <a:r>
+              <a:rPr lang="en-US" dirty="0" smtClean="0"/>
+              <a:t>.</a:t>
+            </a:r>
+          </a:p>
+          <a:p>
+            <a:r>
+              <a:rPr lang="en-US" dirty="0" smtClean="0"/>
+              <a:t>Add some instructions for playing the game.</a:t>
             </a:r>
             <a:endParaRPr lang="en-US" dirty="0"/>
           </a:p>

</xml_diff>